<commit_message>
Actualizacion de Program Document
</commit_message>
<xml_diff>
--- a/04 - Diseño de Niveles.pptx
+++ b/04 - Diseño de Niveles.pptx
@@ -5,12 +5,11 @@
     <p:sldMasterId id="2147483648" r:id="rId1"/>
   </p:sldMasterIdLst>
   <p:notesMasterIdLst>
-    <p:notesMasterId r:id="rId5"/>
+    <p:notesMasterId r:id="rId4"/>
   </p:notesMasterIdLst>
   <p:sldIdLst>
     <p:sldId id="291" r:id="rId2"/>
-    <p:sldId id="296" r:id="rId3"/>
-    <p:sldId id="297" r:id="rId4"/>
+    <p:sldId id="297" r:id="rId3"/>
   </p:sldIdLst>
   <p:sldSz cx="12192000" cy="6858000"/>
   <p:notesSz cx="6858000" cy="9144000"/>
@@ -115,7 +114,6 @@
         <p14:section name="Sección 1: General" id="{8CFAC4F0-4F02-4B27-B9E8-D8CD0594CBD6}">
           <p14:sldIdLst>
             <p14:sldId id="291"/>
-            <p14:sldId id="296"/>
             <p14:sldId id="297"/>
           </p14:sldIdLst>
         </p14:section>
@@ -233,7 +231,7 @@
           <a:p>
             <a:fld id="{31015760-0B9D-4962-8806-24A71FF7CB38}" type="datetimeFigureOut">
               <a:rPr lang="es-ES" smtClean="0"/>
-              <a:t>28/12/2024</a:t>
+              <a:t>16/03/2025</a:t>
             </a:fld>
             <a:endParaRPr lang="es-ES"/>
           </a:p>
@@ -574,90 +572,6 @@
     </p:spTree>
     <p:extLst>
       <p:ext uri="{BB962C8B-B14F-4D97-AF65-F5344CB8AC3E}">
-        <p14:creationId xmlns:p14="http://schemas.microsoft.com/office/powerpoint/2010/main" val="1595380390"/>
-      </p:ext>
-    </p:extLst>
-  </p:cSld>
-  <p:clrMapOvr>
-    <a:masterClrMapping/>
-  </p:clrMapOvr>
-</p:notes>
-</file>
-
-<file path=ppt/notesSlides/notesSlide2.xml><?xml version="1.0" encoding="utf-8"?>
-<p:notes xmlns:a="http://schemas.openxmlformats.org/drawingml/2006/main" xmlns:r="http://schemas.openxmlformats.org/officeDocument/2006/relationships" xmlns:p="http://schemas.openxmlformats.org/presentationml/2006/main">
-  <p:cSld>
-    <p:spTree>
-      <p:nvGrpSpPr>
-        <p:cNvPr id="1" name=""/>
-        <p:cNvGrpSpPr/>
-        <p:nvPr/>
-      </p:nvGrpSpPr>
-      <p:grpSpPr>
-        <a:xfrm>
-          <a:off x="0" y="0"/>
-          <a:ext cx="0" cy="0"/>
-          <a:chOff x="0" y="0"/>
-          <a:chExt cx="0" cy="0"/>
-        </a:xfrm>
-      </p:grpSpPr>
-      <p:sp>
-        <p:nvSpPr>
-          <p:cNvPr id="2" name="Marcador de imagen de diapositiva 1"/>
-          <p:cNvSpPr>
-            <a:spLocks noGrp="1" noRot="1" noChangeAspect="1"/>
-          </p:cNvSpPr>
-          <p:nvPr>
-            <p:ph type="sldImg"/>
-          </p:nvPr>
-        </p:nvSpPr>
-        <p:spPr/>
-      </p:sp>
-      <p:sp>
-        <p:nvSpPr>
-          <p:cNvPr id="3" name="Marcador de notas 2"/>
-          <p:cNvSpPr>
-            <a:spLocks noGrp="1"/>
-          </p:cNvSpPr>
-          <p:nvPr>
-            <p:ph type="body" idx="1"/>
-          </p:nvPr>
-        </p:nvSpPr>
-        <p:spPr/>
-        <p:txBody>
-          <a:bodyPr/>
-          <a:lstStyle/>
-          <a:p>
-            <a:endParaRPr lang="es-UY" dirty="0"/>
-          </a:p>
-        </p:txBody>
-      </p:sp>
-      <p:sp>
-        <p:nvSpPr>
-          <p:cNvPr id="4" name="Marcador de número de diapositiva 3"/>
-          <p:cNvSpPr>
-            <a:spLocks noGrp="1"/>
-          </p:cNvSpPr>
-          <p:nvPr>
-            <p:ph type="sldNum" sz="quarter" idx="5"/>
-          </p:nvPr>
-        </p:nvSpPr>
-        <p:spPr/>
-        <p:txBody>
-          <a:bodyPr/>
-          <a:lstStyle/>
-          <a:p>
-            <a:fld id="{9F23F2D7-B2A1-490D-91DD-A42768B2402D}" type="slidenum">
-              <a:rPr lang="es-ES" smtClean="0"/>
-              <a:t>3</a:t>
-            </a:fld>
-            <a:endParaRPr lang="es-ES"/>
-          </a:p>
-        </p:txBody>
-      </p:sp>
-    </p:spTree>
-    <p:extLst>
-      <p:ext uri="{BB962C8B-B14F-4D97-AF65-F5344CB8AC3E}">
         <p14:creationId xmlns:p14="http://schemas.microsoft.com/office/powerpoint/2010/main" val="3762879320"/>
       </p:ext>
     </p:extLst>
@@ -817,7 +731,7 @@
           <a:p>
             <a:fld id="{3519C4E0-327D-4001-842B-6143C18E08C1}" type="datetimeFigureOut">
               <a:rPr lang="es-UY" smtClean="0"/>
-              <a:t>28/12/2024</a:t>
+              <a:t>16/3/2025</a:t>
             </a:fld>
             <a:endParaRPr lang="es-UY"/>
           </a:p>
@@ -1017,7 +931,7 @@
           <a:p>
             <a:fld id="{3519C4E0-327D-4001-842B-6143C18E08C1}" type="datetimeFigureOut">
               <a:rPr lang="es-UY" smtClean="0"/>
-              <a:t>28/12/2024</a:t>
+              <a:t>16/3/2025</a:t>
             </a:fld>
             <a:endParaRPr lang="es-UY"/>
           </a:p>
@@ -1227,7 +1141,7 @@
           <a:p>
             <a:fld id="{3519C4E0-327D-4001-842B-6143C18E08C1}" type="datetimeFigureOut">
               <a:rPr lang="es-UY" smtClean="0"/>
-              <a:t>28/12/2024</a:t>
+              <a:t>16/3/2025</a:t>
             </a:fld>
             <a:endParaRPr lang="es-UY"/>
           </a:p>
@@ -1427,7 +1341,7 @@
           <a:p>
             <a:fld id="{3519C4E0-327D-4001-842B-6143C18E08C1}" type="datetimeFigureOut">
               <a:rPr lang="es-UY" smtClean="0"/>
-              <a:t>28/12/2024</a:t>
+              <a:t>16/3/2025</a:t>
             </a:fld>
             <a:endParaRPr lang="es-UY"/>
           </a:p>
@@ -1703,7 +1617,7 @@
           <a:p>
             <a:fld id="{3519C4E0-327D-4001-842B-6143C18E08C1}" type="datetimeFigureOut">
               <a:rPr lang="es-UY" smtClean="0"/>
-              <a:t>28/12/2024</a:t>
+              <a:t>16/3/2025</a:t>
             </a:fld>
             <a:endParaRPr lang="es-UY"/>
           </a:p>
@@ -1971,7 +1885,7 @@
           <a:p>
             <a:fld id="{3519C4E0-327D-4001-842B-6143C18E08C1}" type="datetimeFigureOut">
               <a:rPr lang="es-UY" smtClean="0"/>
-              <a:t>28/12/2024</a:t>
+              <a:t>16/3/2025</a:t>
             </a:fld>
             <a:endParaRPr lang="es-UY"/>
           </a:p>
@@ -2386,7 +2300,7 @@
           <a:p>
             <a:fld id="{3519C4E0-327D-4001-842B-6143C18E08C1}" type="datetimeFigureOut">
               <a:rPr lang="es-UY" smtClean="0"/>
-              <a:t>28/12/2024</a:t>
+              <a:t>16/3/2025</a:t>
             </a:fld>
             <a:endParaRPr lang="es-UY"/>
           </a:p>
@@ -2528,7 +2442,7 @@
           <a:p>
             <a:fld id="{3519C4E0-327D-4001-842B-6143C18E08C1}" type="datetimeFigureOut">
               <a:rPr lang="es-UY" smtClean="0"/>
-              <a:t>28/12/2024</a:t>
+              <a:t>16/3/2025</a:t>
             </a:fld>
             <a:endParaRPr lang="es-UY"/>
           </a:p>
@@ -2641,7 +2555,7 @@
           <a:p>
             <a:fld id="{3519C4E0-327D-4001-842B-6143C18E08C1}" type="datetimeFigureOut">
               <a:rPr lang="es-UY" smtClean="0"/>
-              <a:t>28/12/2024</a:t>
+              <a:t>16/3/2025</a:t>
             </a:fld>
             <a:endParaRPr lang="es-UY"/>
           </a:p>
@@ -2954,7 +2868,7 @@
           <a:p>
             <a:fld id="{3519C4E0-327D-4001-842B-6143C18E08C1}" type="datetimeFigureOut">
               <a:rPr lang="es-UY" smtClean="0"/>
-              <a:t>28/12/2024</a:t>
+              <a:t>16/3/2025</a:t>
             </a:fld>
             <a:endParaRPr lang="es-UY"/>
           </a:p>
@@ -3243,7 +3157,7 @@
           <a:p>
             <a:fld id="{3519C4E0-327D-4001-842B-6143C18E08C1}" type="datetimeFigureOut">
               <a:rPr lang="es-UY" smtClean="0"/>
-              <a:t>28/12/2024</a:t>
+              <a:t>16/3/2025</a:t>
             </a:fld>
             <a:endParaRPr lang="es-UY"/>
           </a:p>
@@ -3486,7 +3400,7 @@
           <a:p>
             <a:fld id="{3519C4E0-327D-4001-842B-6143C18E08C1}" type="datetimeFigureOut">
               <a:rPr lang="es-UY" smtClean="0"/>
-              <a:t>28/12/2024</a:t>
+              <a:t>16/3/2025</a:t>
             </a:fld>
             <a:endParaRPr lang="es-UY"/>
           </a:p>
@@ -4226,675 +4140,6 @@
 </file>
 
 <file path=ppt/slides/slide2.xml><?xml version="1.0" encoding="utf-8"?>
-<p:sld xmlns:a="http://schemas.openxmlformats.org/drawingml/2006/main" xmlns:r="http://schemas.openxmlformats.org/officeDocument/2006/relationships" xmlns:p="http://schemas.openxmlformats.org/presentationml/2006/main">
-  <p:cSld>
-    <p:spTree>
-      <p:nvGrpSpPr>
-        <p:cNvPr id="1" name=""/>
-        <p:cNvGrpSpPr/>
-        <p:nvPr/>
-      </p:nvGrpSpPr>
-      <p:grpSpPr>
-        <a:xfrm>
-          <a:off x="0" y="0"/>
-          <a:ext cx="0" cy="0"/>
-          <a:chOff x="0" y="0"/>
-          <a:chExt cx="0" cy="0"/>
-        </a:xfrm>
-      </p:grpSpPr>
-      <p:sp>
-        <p:nvSpPr>
-          <p:cNvPr id="6" name="Rectángulo: esquinas redondeadas 5">
-            <a:extLst>
-              <a:ext uri="{FF2B5EF4-FFF2-40B4-BE49-F238E27FC236}">
-                <a16:creationId xmlns:a16="http://schemas.microsoft.com/office/drawing/2014/main" id="{9FDA4CC4-0F47-4B41-92EC-8526BA0C57AC}"/>
-              </a:ext>
-            </a:extLst>
-          </p:cNvPr>
-          <p:cNvSpPr/>
-          <p:nvPr/>
-        </p:nvSpPr>
-        <p:spPr>
-          <a:xfrm>
-            <a:off x="159798" y="106533"/>
-            <a:ext cx="11880000" cy="900000"/>
-          </a:xfrm>
-          <a:prstGeom prst="roundRect">
-            <a:avLst/>
-          </a:prstGeom>
-          <a:solidFill>
-            <a:schemeClr val="tx1"/>
-          </a:solidFill>
-          <a:ln>
-            <a:noFill/>
-          </a:ln>
-        </p:spPr>
-        <p:style>
-          <a:lnRef idx="2">
-            <a:schemeClr val="accent1">
-              <a:shade val="50000"/>
-            </a:schemeClr>
-          </a:lnRef>
-          <a:fillRef idx="1">
-            <a:schemeClr val="accent1"/>
-          </a:fillRef>
-          <a:effectRef idx="0">
-            <a:schemeClr val="accent1"/>
-          </a:effectRef>
-          <a:fontRef idx="minor">
-            <a:schemeClr val="lt1"/>
-          </a:fontRef>
-        </p:style>
-        <p:txBody>
-          <a:bodyPr rtlCol="0" anchor="ctr"/>
-          <a:lstStyle/>
-          <a:p>
-            <a:pPr algn="ctr"/>
-            <a:r>
-              <a:rPr lang="es-UY" sz="6600" dirty="0">
-                <a:latin typeface="Times New Roman" panose="02020603050405020304" pitchFamily="18" charset="0"/>
-                <a:cs typeface="Times New Roman" panose="02020603050405020304" pitchFamily="18" charset="0"/>
-              </a:rPr>
-              <a:t>1. Estructura</a:t>
-            </a:r>
-          </a:p>
-        </p:txBody>
-      </p:sp>
-      <p:sp>
-        <p:nvSpPr>
-          <p:cNvPr id="8" name="Rectángulo: esquinas redondeadas 7">
-            <a:extLst>
-              <a:ext uri="{FF2B5EF4-FFF2-40B4-BE49-F238E27FC236}">
-                <a16:creationId xmlns:a16="http://schemas.microsoft.com/office/drawing/2014/main" id="{FF0331ED-A3EF-47AE-B6CE-A5E803206B3E}"/>
-              </a:ext>
-            </a:extLst>
-          </p:cNvPr>
-          <p:cNvSpPr/>
-          <p:nvPr/>
-        </p:nvSpPr>
-        <p:spPr>
-          <a:xfrm>
-            <a:off x="159798" y="1099051"/>
-            <a:ext cx="5845305" cy="4822356"/>
-          </a:xfrm>
-          <a:prstGeom prst="roundRect">
-            <a:avLst>
-              <a:gd name="adj" fmla="val 3075"/>
-            </a:avLst>
-          </a:prstGeom>
-          <a:solidFill>
-            <a:schemeClr val="bg1"/>
-          </a:solidFill>
-          <a:ln w="28575">
-            <a:solidFill>
-              <a:schemeClr val="tx1"/>
-            </a:solidFill>
-          </a:ln>
-        </p:spPr>
-        <p:style>
-          <a:lnRef idx="2">
-            <a:schemeClr val="accent1">
-              <a:shade val="50000"/>
-            </a:schemeClr>
-          </a:lnRef>
-          <a:fillRef idx="1">
-            <a:schemeClr val="accent1"/>
-          </a:fillRef>
-          <a:effectRef idx="0">
-            <a:schemeClr val="accent1"/>
-          </a:effectRef>
-          <a:fontRef idx="minor">
-            <a:schemeClr val="lt1"/>
-          </a:fontRef>
-        </p:style>
-        <p:txBody>
-          <a:bodyPr rtlCol="0" anchor="t"/>
-          <a:lstStyle/>
-          <a:p>
-            <a:pPr algn="just"/>
-            <a:r>
-              <a:rPr lang="es-MX" sz="1400" u="sng" dirty="0">
-                <a:solidFill>
-                  <a:schemeClr val="tx1"/>
-                </a:solidFill>
-              </a:rPr>
-              <a:t>1.1. General</a:t>
-            </a:r>
-          </a:p>
-          <a:p>
-            <a:pPr algn="just"/>
-            <a:r>
-              <a:rPr lang="es-MX" sz="1200" dirty="0">
-                <a:solidFill>
-                  <a:schemeClr val="tx1"/>
-                </a:solidFill>
-              </a:rPr>
-              <a:t>Los niveles están basados en hechos históricos en los que participo José Gervasio Artigas</a:t>
-            </a:r>
-          </a:p>
-          <a:p>
-            <a:pPr algn="just"/>
-            <a:endParaRPr lang="es-MX" sz="1400" u="sng" dirty="0">
-              <a:solidFill>
-                <a:schemeClr val="tx1"/>
-              </a:solidFill>
-            </a:endParaRPr>
-          </a:p>
-          <a:p>
-            <a:pPr algn="just"/>
-            <a:r>
-              <a:rPr lang="es-MX" sz="1400" u="sng" dirty="0">
-                <a:solidFill>
-                  <a:schemeClr val="tx1"/>
-                </a:solidFill>
-              </a:rPr>
-              <a:t>1.2. Elementos</a:t>
-            </a:r>
-          </a:p>
-          <a:p>
-            <a:pPr algn="just"/>
-            <a:r>
-              <a:rPr lang="es-MX" sz="1200" dirty="0">
-                <a:solidFill>
-                  <a:schemeClr val="tx1"/>
-                </a:solidFill>
-              </a:rPr>
-              <a:t>Ciertos elementos se repiten en el cada nivel por consistencia.</a:t>
-            </a:r>
-          </a:p>
-          <a:p>
-            <a:pPr algn="just"/>
-            <a:endParaRPr lang="es-MX" sz="1200" dirty="0">
-              <a:solidFill>
-                <a:schemeClr val="tx1"/>
-              </a:solidFill>
-            </a:endParaRPr>
-          </a:p>
-          <a:p>
-            <a:pPr marL="171450" indent="-171450" algn="just">
-              <a:buFont typeface="Arial" panose="020B0604020202020204" pitchFamily="34" charset="0"/>
-              <a:buChar char="•"/>
-            </a:pPr>
-            <a:r>
-              <a:rPr lang="es-MX" sz="1200" i="1" dirty="0">
-                <a:solidFill>
-                  <a:schemeClr val="tx1"/>
-                </a:solidFill>
-              </a:rPr>
-              <a:t>Inicio de Nivel</a:t>
-            </a:r>
-          </a:p>
-          <a:p>
-            <a:pPr algn="just"/>
-            <a:r>
-              <a:rPr lang="es-MX" sz="1200" dirty="0">
-                <a:solidFill>
-                  <a:schemeClr val="tx1"/>
-                </a:solidFill>
-              </a:rPr>
-              <a:t>Cada nivel tiene una tarjeta de introducción con el numero de nivel, el nombre y el año en el que se lleva acabo. Esta tarjeta desaparece al salir de la vista del jugador.</a:t>
-            </a:r>
-          </a:p>
-          <a:p>
-            <a:pPr algn="just"/>
-            <a:endParaRPr lang="es-MX" sz="1200" dirty="0">
-              <a:solidFill>
-                <a:schemeClr val="tx1"/>
-              </a:solidFill>
-            </a:endParaRPr>
-          </a:p>
-          <a:p>
-            <a:pPr marL="171450" indent="-171450" algn="just">
-              <a:buFont typeface="Arial" panose="020B0604020202020204" pitchFamily="34" charset="0"/>
-              <a:buChar char="•"/>
-            </a:pPr>
-            <a:r>
-              <a:rPr lang="es-MX" sz="1200" i="1" dirty="0">
-                <a:solidFill>
-                  <a:schemeClr val="tx1"/>
-                </a:solidFill>
-              </a:rPr>
-              <a:t>Checkpoint</a:t>
-            </a:r>
-          </a:p>
-          <a:p>
-            <a:pPr algn="just"/>
-            <a:r>
-              <a:rPr lang="es-MX" sz="1200" dirty="0">
-                <a:solidFill>
-                  <a:schemeClr val="tx1"/>
-                </a:solidFill>
-              </a:rPr>
-              <a:t>Cada nivel tiene una tarjeta de introducción con el numero de nivel, el nombre y el año en el que se lleva acabo. Esta tarjeta desaparece al salir de la vista del jugador.</a:t>
-            </a:r>
-          </a:p>
-          <a:p>
-            <a:pPr algn="just"/>
-            <a:endParaRPr lang="es-MX" sz="1200" dirty="0">
-              <a:solidFill>
-                <a:schemeClr val="tx1"/>
-              </a:solidFill>
-            </a:endParaRPr>
-          </a:p>
-          <a:p>
-            <a:pPr marL="171450" indent="-171450" algn="just">
-              <a:buFont typeface="Arial" panose="020B0604020202020204" pitchFamily="34" charset="0"/>
-              <a:buChar char="•"/>
-            </a:pPr>
-            <a:r>
-              <a:rPr lang="es-MX" sz="1200" i="1" dirty="0">
-                <a:solidFill>
-                  <a:schemeClr val="tx1"/>
-                </a:solidFill>
-              </a:rPr>
-              <a:t>Ítem</a:t>
-            </a:r>
-          </a:p>
-          <a:p>
-            <a:pPr algn="just"/>
-            <a:r>
-              <a:rPr lang="es-MX" sz="1200" dirty="0">
-                <a:solidFill>
-                  <a:schemeClr val="tx1"/>
-                </a:solidFill>
-              </a:rPr>
-              <a:t>Cada nivel tiene un ítem especifico, el diseño de algunas secciones gira en torno a estas y son necesarias para acceder a otras.</a:t>
-            </a:r>
-          </a:p>
-          <a:p>
-            <a:pPr algn="just"/>
-            <a:endParaRPr lang="es-MX" sz="1200" dirty="0">
-              <a:solidFill>
-                <a:schemeClr val="tx1"/>
-              </a:solidFill>
-            </a:endParaRPr>
-          </a:p>
-          <a:p>
-            <a:pPr marL="171450" indent="-171450" algn="just">
-              <a:buFont typeface="Arial" panose="020B0604020202020204" pitchFamily="34" charset="0"/>
-              <a:buChar char="•"/>
-            </a:pPr>
-            <a:r>
-              <a:rPr lang="es-MX" sz="1200" i="1" dirty="0">
-                <a:solidFill>
-                  <a:schemeClr val="tx1"/>
-                </a:solidFill>
-              </a:rPr>
-              <a:t>Enemigos</a:t>
-            </a:r>
-          </a:p>
-          <a:p>
-            <a:pPr algn="just"/>
-            <a:r>
-              <a:rPr lang="es-MX" sz="1200" dirty="0">
-                <a:solidFill>
-                  <a:schemeClr val="tx1"/>
-                </a:solidFill>
-              </a:rPr>
-              <a:t>Se intenta que estén a la par temáticamente con el nivel, cumplen una función simple.</a:t>
-            </a:r>
-          </a:p>
-          <a:p>
-            <a:pPr algn="just"/>
-            <a:endParaRPr lang="es-MX" sz="1200" dirty="0">
-              <a:solidFill>
-                <a:schemeClr val="tx1"/>
-              </a:solidFill>
-            </a:endParaRPr>
-          </a:p>
-          <a:p>
-            <a:pPr marL="171450" indent="-171450" algn="just">
-              <a:buFont typeface="Arial" panose="020B0604020202020204" pitchFamily="34" charset="0"/>
-              <a:buChar char="•"/>
-            </a:pPr>
-            <a:r>
-              <a:rPr lang="es-MX" sz="1200" i="1" dirty="0">
-                <a:solidFill>
-                  <a:schemeClr val="tx1"/>
-                </a:solidFill>
-              </a:rPr>
-              <a:t>Jefes</a:t>
-            </a:r>
-          </a:p>
-          <a:p>
-            <a:pPr algn="just"/>
-            <a:r>
-              <a:rPr lang="es-MX" sz="1200" dirty="0">
-                <a:solidFill>
-                  <a:schemeClr val="tx1"/>
-                </a:solidFill>
-              </a:rPr>
-              <a:t>Generalmente representando una figura histórica. La idea es que sea una mezcla de las mecánicas de los enemigos del nivel pero exageradas.</a:t>
-            </a:r>
-          </a:p>
-          <a:p>
-            <a:pPr algn="just"/>
-            <a:endParaRPr lang="es-MX" sz="1200" dirty="0">
-              <a:solidFill>
-                <a:schemeClr val="tx1"/>
-              </a:solidFill>
-            </a:endParaRPr>
-          </a:p>
-        </p:txBody>
-      </p:sp>
-      <p:grpSp>
-        <p:nvGrpSpPr>
-          <p:cNvPr id="2" name="Grupo 1">
-            <a:extLst>
-              <a:ext uri="{FF2B5EF4-FFF2-40B4-BE49-F238E27FC236}">
-                <a16:creationId xmlns:a16="http://schemas.microsoft.com/office/drawing/2014/main" id="{216F3E00-B384-44FF-B16D-BD476B47BBBF}"/>
-              </a:ext>
-            </a:extLst>
-          </p:cNvPr>
-          <p:cNvGrpSpPr/>
-          <p:nvPr/>
-        </p:nvGrpSpPr>
-        <p:grpSpPr>
-          <a:xfrm>
-            <a:off x="6157964" y="1099050"/>
-            <a:ext cx="5865624" cy="1851193"/>
-            <a:chOff x="6178284" y="1081295"/>
-            <a:chExt cx="5641115" cy="1780338"/>
-          </a:xfrm>
-        </p:grpSpPr>
-        <p:pic>
-          <p:nvPicPr>
-            <p:cNvPr id="11" name="Imagen 10">
-              <a:extLst>
-                <a:ext uri="{FF2B5EF4-FFF2-40B4-BE49-F238E27FC236}">
-                  <a16:creationId xmlns:a16="http://schemas.microsoft.com/office/drawing/2014/main" id="{5CE1E10D-FBF7-4A38-A813-4698B8E1A510}"/>
-                </a:ext>
-              </a:extLst>
-            </p:cNvPr>
-            <p:cNvPicPr>
-              <a:picLocks noChangeAspect="1"/>
-            </p:cNvPicPr>
-            <p:nvPr/>
-          </p:nvPicPr>
-          <p:blipFill>
-            <a:blip r:embed="rId3"/>
-            <a:stretch>
-              <a:fillRect/>
-            </a:stretch>
-          </p:blipFill>
-          <p:spPr>
-            <a:xfrm>
-              <a:off x="6178284" y="1081295"/>
-              <a:ext cx="3164286" cy="1780338"/>
-            </a:xfrm>
-            <a:prstGeom prst="rect">
-              <a:avLst/>
-            </a:prstGeom>
-            <a:ln w="19050">
-              <a:solidFill>
-                <a:schemeClr val="tx1"/>
-              </a:solidFill>
-            </a:ln>
-          </p:spPr>
-        </p:pic>
-        <p:grpSp>
-          <p:nvGrpSpPr>
-            <p:cNvPr id="13" name="Grupo 12">
-              <a:extLst>
-                <a:ext uri="{FF2B5EF4-FFF2-40B4-BE49-F238E27FC236}">
-                  <a16:creationId xmlns:a16="http://schemas.microsoft.com/office/drawing/2014/main" id="{CD35AEC0-8EB7-4DC7-B14C-3D81F2CAC0FF}"/>
-                </a:ext>
-              </a:extLst>
-            </p:cNvPr>
-            <p:cNvGrpSpPr/>
-            <p:nvPr/>
-          </p:nvGrpSpPr>
-          <p:grpSpPr>
-            <a:xfrm>
-              <a:off x="9405421" y="1081295"/>
-              <a:ext cx="2413978" cy="1780338"/>
-              <a:chOff x="6902838" y="3429000"/>
-              <a:chExt cx="3164286" cy="2333699"/>
-            </a:xfrm>
-          </p:grpSpPr>
-          <p:pic>
-            <p:nvPicPr>
-              <p:cNvPr id="14" name="Imagen 13">
-                <a:extLst>
-                  <a:ext uri="{FF2B5EF4-FFF2-40B4-BE49-F238E27FC236}">
-                    <a16:creationId xmlns:a16="http://schemas.microsoft.com/office/drawing/2014/main" id="{946DBD37-BB5A-4C0F-A8DF-37C57A124B12}"/>
-                  </a:ext>
-                </a:extLst>
-              </p:cNvPr>
-              <p:cNvPicPr>
-                <a:picLocks noChangeAspect="1"/>
-              </p:cNvPicPr>
-              <p:nvPr/>
-            </p:nvPicPr>
-            <p:blipFill>
-              <a:blip r:embed="rId4"/>
-              <a:stretch>
-                <a:fillRect/>
-              </a:stretch>
-            </p:blipFill>
-            <p:spPr>
-              <a:xfrm>
-                <a:off x="6902839" y="3429000"/>
-                <a:ext cx="3164285" cy="2333699"/>
-              </a:xfrm>
-              <a:prstGeom prst="rect">
-                <a:avLst/>
-              </a:prstGeom>
-              <a:ln w="19050">
-                <a:solidFill>
-                  <a:schemeClr val="tx1"/>
-                </a:solidFill>
-              </a:ln>
-            </p:spPr>
-          </p:pic>
-          <p:sp>
-            <p:nvSpPr>
-              <p:cNvPr id="15" name="Google Shape;95;p2">
-                <a:extLst>
-                  <a:ext uri="{FF2B5EF4-FFF2-40B4-BE49-F238E27FC236}">
-                    <a16:creationId xmlns:a16="http://schemas.microsoft.com/office/drawing/2014/main" id="{E40F8A9C-866F-47B9-A2E6-66CEEBDB300B}"/>
-                  </a:ext>
-                </a:extLst>
-              </p:cNvPr>
-              <p:cNvSpPr/>
-              <p:nvPr/>
-            </p:nvSpPr>
-            <p:spPr>
-              <a:xfrm>
-                <a:off x="6902838" y="5528944"/>
-                <a:ext cx="3164285" cy="233755"/>
-              </a:xfrm>
-              <a:prstGeom prst="rect">
-                <a:avLst/>
-              </a:prstGeom>
-              <a:solidFill>
-                <a:schemeClr val="dk1"/>
-              </a:solidFill>
-              <a:ln>
-                <a:noFill/>
-              </a:ln>
-            </p:spPr>
-            <p:txBody>
-              <a:bodyPr spcFirstLastPara="1" wrap="square" lIns="91425" tIns="45700" rIns="91425" bIns="45700" anchor="ctr" anchorCtr="0">
-                <a:noAutofit/>
-              </a:bodyPr>
-              <a:lstStyle/>
-              <a:p>
-                <a:pPr marL="0" marR="0" lvl="0" indent="0" algn="ctr" rtl="0">
-                  <a:spcBef>
-                    <a:spcPts val="0"/>
-                  </a:spcBef>
-                  <a:spcAft>
-                    <a:spcPts val="0"/>
-                  </a:spcAft>
-                  <a:buNone/>
-                </a:pPr>
-                <a:r>
-                  <a:rPr lang="es-ES" sz="1200" b="0" u="none" strike="noStrike" cap="none" dirty="0">
-                    <a:solidFill>
-                      <a:schemeClr val="lt1"/>
-                    </a:solidFill>
-                    <a:latin typeface="Arial"/>
-                    <a:ea typeface="Arial"/>
-                    <a:cs typeface="Arial"/>
-                    <a:sym typeface="Arial"/>
-                  </a:rPr>
-                  <a:t>Casltevania: Rondo of Blood</a:t>
-                </a:r>
-                <a:endParaRPr sz="1200" b="0" u="none" strike="noStrike" cap="none" dirty="0">
-                  <a:solidFill>
-                    <a:schemeClr val="lt1"/>
-                  </a:solidFill>
-                  <a:latin typeface="Arial"/>
-                  <a:ea typeface="Arial"/>
-                  <a:cs typeface="Arial"/>
-                  <a:sym typeface="Arial"/>
-                </a:endParaRPr>
-              </a:p>
-            </p:txBody>
-          </p:sp>
-        </p:grpSp>
-      </p:grpSp>
-      <p:grpSp>
-        <p:nvGrpSpPr>
-          <p:cNvPr id="3" name="Grupo 2">
-            <a:extLst>
-              <a:ext uri="{FF2B5EF4-FFF2-40B4-BE49-F238E27FC236}">
-                <a16:creationId xmlns:a16="http://schemas.microsoft.com/office/drawing/2014/main" id="{5CD6DB80-0F40-4D58-BB93-498146994A26}"/>
-              </a:ext>
-            </a:extLst>
-          </p:cNvPr>
-          <p:cNvGrpSpPr/>
-          <p:nvPr/>
-        </p:nvGrpSpPr>
-        <p:grpSpPr>
-          <a:xfrm>
-            <a:off x="6157963" y="3031202"/>
-            <a:ext cx="5872782" cy="1083773"/>
-            <a:chOff x="6118823" y="3004393"/>
-            <a:chExt cx="8258246" cy="1523990"/>
-          </a:xfrm>
-        </p:grpSpPr>
-        <p:pic>
-          <p:nvPicPr>
-            <p:cNvPr id="18" name="Imagen 17">
-              <a:extLst>
-                <a:ext uri="{FF2B5EF4-FFF2-40B4-BE49-F238E27FC236}">
-                  <a16:creationId xmlns:a16="http://schemas.microsoft.com/office/drawing/2014/main" id="{5DB847C4-254E-486E-B93C-499EE5329CEF}"/>
-                </a:ext>
-              </a:extLst>
-            </p:cNvPr>
-            <p:cNvPicPr>
-              <a:picLocks noChangeAspect="1"/>
-            </p:cNvPicPr>
-            <p:nvPr/>
-          </p:nvPicPr>
-          <p:blipFill>
-            <a:blip r:embed="rId5"/>
-            <a:stretch>
-              <a:fillRect/>
-            </a:stretch>
-          </p:blipFill>
-          <p:spPr>
-            <a:xfrm>
-              <a:off x="6118823" y="3004393"/>
-              <a:ext cx="2690590" cy="1511271"/>
-            </a:xfrm>
-            <a:prstGeom prst="rect">
-              <a:avLst/>
-            </a:prstGeom>
-            <a:ln w="19050">
-              <a:solidFill>
-                <a:schemeClr val="tx1"/>
-              </a:solidFill>
-            </a:ln>
-          </p:spPr>
-        </p:pic>
-        <p:pic>
-          <p:nvPicPr>
-            <p:cNvPr id="19" name="Imagen 18">
-              <a:extLst>
-                <a:ext uri="{FF2B5EF4-FFF2-40B4-BE49-F238E27FC236}">
-                  <a16:creationId xmlns:a16="http://schemas.microsoft.com/office/drawing/2014/main" id="{6FA4AF25-004D-4341-B56E-25887D400EF4}"/>
-                </a:ext>
-              </a:extLst>
-            </p:cNvPr>
-            <p:cNvPicPr>
-              <a:picLocks noChangeAspect="1"/>
-            </p:cNvPicPr>
-            <p:nvPr/>
-          </p:nvPicPr>
-          <p:blipFill>
-            <a:blip r:embed="rId6"/>
-            <a:stretch>
-              <a:fillRect/>
-            </a:stretch>
-          </p:blipFill>
-          <p:spPr>
-            <a:xfrm>
-              <a:off x="8898000" y="3004393"/>
-              <a:ext cx="2690589" cy="1511271"/>
-            </a:xfrm>
-            <a:prstGeom prst="rect">
-              <a:avLst/>
-            </a:prstGeom>
-            <a:ln w="19050">
-              <a:solidFill>
-                <a:schemeClr val="tx1"/>
-              </a:solidFill>
-            </a:ln>
-          </p:spPr>
-        </p:pic>
-        <p:pic>
-          <p:nvPicPr>
-            <p:cNvPr id="20" name="Imagen 19">
-              <a:extLst>
-                <a:ext uri="{FF2B5EF4-FFF2-40B4-BE49-F238E27FC236}">
-                  <a16:creationId xmlns:a16="http://schemas.microsoft.com/office/drawing/2014/main" id="{FE119837-C110-43A8-92AD-883541F29640}"/>
-                </a:ext>
-              </a:extLst>
-            </p:cNvPr>
-            <p:cNvPicPr>
-              <a:picLocks noChangeAspect="1"/>
-            </p:cNvPicPr>
-            <p:nvPr/>
-          </p:nvPicPr>
-          <p:blipFill>
-            <a:blip r:embed="rId7"/>
-            <a:stretch>
-              <a:fillRect/>
-            </a:stretch>
-          </p:blipFill>
-          <p:spPr>
-            <a:xfrm>
-              <a:off x="11677177" y="3004393"/>
-              <a:ext cx="2699892" cy="1523990"/>
-            </a:xfrm>
-            <a:prstGeom prst="rect">
-              <a:avLst/>
-            </a:prstGeom>
-            <a:ln w="19050">
-              <a:solidFill>
-                <a:schemeClr val="tx1"/>
-              </a:solidFill>
-            </a:ln>
-          </p:spPr>
-        </p:pic>
-      </p:grpSp>
-    </p:spTree>
-    <p:extLst>
-      <p:ext uri="{BB962C8B-B14F-4D97-AF65-F5344CB8AC3E}">
-        <p14:creationId xmlns:p14="http://schemas.microsoft.com/office/powerpoint/2010/main" val="609710952"/>
-      </p:ext>
-    </p:extLst>
-  </p:cSld>
-  <p:clrMapOvr>
-    <a:masterClrMapping/>
-  </p:clrMapOvr>
-</p:sld>
-</file>
-
-<file path=ppt/slides/slide3.xml><?xml version="1.0" encoding="utf-8"?>
 <p:sld xmlns:a="http://schemas.openxmlformats.org/drawingml/2006/main" xmlns:r="http://schemas.openxmlformats.org/officeDocument/2006/relationships" xmlns:p="http://schemas.openxmlformats.org/presentationml/2006/main">
   <p:cSld>
     <p:spTree>

</xml_diff>